<commit_message>
:books: changed architecture diagrams for development env
</commit_message>
<xml_diff>
--- a/docs/architecture/dev.pptx
+++ b/docs/architecture/dev.pptx
@@ -3628,7 +3628,7 @@
         </p:nvGrpSpPr>
         <p:grpSpPr>
           <a:xfrm>
-            <a:off x="7374832" y="2969367"/>
+            <a:off x="8107070" y="2395737"/>
             <a:ext cx="2279650" cy="1040586"/>
             <a:chOff x="4956175" y="2908707"/>
             <a:chExt cx="2279650" cy="1040586"/>
@@ -3895,7 +3895,7 @@
         </p:nvGrpSpPr>
         <p:grpSpPr>
           <a:xfrm>
-            <a:off x="5214041" y="1199752"/>
+            <a:off x="5214041" y="620139"/>
             <a:ext cx="1939797" cy="898495"/>
             <a:chOff x="4974431" y="2909500"/>
             <a:chExt cx="2243137" cy="1038999"/>
@@ -4162,7 +4162,7 @@
         </p:nvGrpSpPr>
         <p:grpSpPr>
           <a:xfrm>
-            <a:off x="5433720" y="2967022"/>
+            <a:off x="6413362" y="2387409"/>
             <a:ext cx="2292350" cy="1038205"/>
             <a:chOff x="4949825" y="2909897"/>
             <a:chExt cx="2292350" cy="1038205"/>
@@ -4429,7 +4429,7 @@
         </p:nvGrpSpPr>
         <p:grpSpPr>
           <a:xfrm>
-            <a:off x="3691694" y="2955280"/>
+            <a:off x="4893330" y="2380465"/>
             <a:ext cx="2243137" cy="1038999"/>
             <a:chOff x="4974432" y="2909500"/>
             <a:chExt cx="2243137" cy="1038999"/>
@@ -4696,8 +4696,8 @@
         </p:nvGrpSpPr>
         <p:grpSpPr>
           <a:xfrm>
-            <a:off x="3498980" y="1026367"/>
-            <a:ext cx="6506740" cy="3209731"/>
+            <a:off x="1492898" y="446755"/>
+            <a:ext cx="8512822" cy="5057192"/>
             <a:chOff x="355600" y="1512745"/>
             <a:chExt cx="1765300" cy="890588"/>
           </a:xfrm>
@@ -4923,7 +4923,7 @@
           <p:spPr>
             <a:xfrm>
               <a:off x="355600" y="1512745"/>
-              <a:ext cx="90402" cy="90402"/>
+              <a:ext cx="90402" cy="73602"/>
             </a:xfrm>
             <a:prstGeom prst="rect">
               <a:avLst/>
@@ -4949,8 +4949,8 @@
         </p:nvCxnSpPr>
         <p:spPr>
           <a:xfrm>
-            <a:off x="5191881" y="3336280"/>
-            <a:ext cx="1000664" cy="11742"/>
+            <a:off x="6393517" y="2761465"/>
+            <a:ext cx="778670" cy="6944"/>
           </a:xfrm>
           <a:prstGeom prst="straightConnector1">
             <a:avLst/>
@@ -4994,8 +4994,8 @@
         </p:nvCxnSpPr>
         <p:spPr>
           <a:xfrm>
-            <a:off x="6954545" y="3348022"/>
-            <a:ext cx="1167999" cy="0"/>
+            <a:off x="7934187" y="2768409"/>
+            <a:ext cx="911070" cy="8329"/>
           </a:xfrm>
           <a:prstGeom prst="straightConnector1">
             <a:avLst/>
@@ -5044,7 +5044,7 @@
         </p:blipFill>
         <p:spPr>
           <a:xfrm>
-            <a:off x="3003035" y="2791329"/>
+            <a:off x="922585" y="3270139"/>
             <a:ext cx="852364" cy="1275342"/>
           </a:xfrm>
           <a:prstGeom prst="rect">
@@ -5066,7 +5066,7 @@
         </p:nvGrpSpPr>
         <p:grpSpPr>
           <a:xfrm>
-            <a:off x="6556752" y="1172976"/>
+            <a:off x="6556752" y="593363"/>
             <a:ext cx="2058622" cy="954990"/>
             <a:chOff x="2249488" y="1182688"/>
             <a:chExt cx="2243137" cy="1040586"/>
@@ -5306,7 +5306,7 @@
         </p:nvGrpSpPr>
         <p:grpSpPr>
           <a:xfrm>
-            <a:off x="8122544" y="1189689"/>
+            <a:off x="8122544" y="610076"/>
             <a:ext cx="1971285" cy="1058142"/>
             <a:chOff x="6786563" y="1184275"/>
             <a:chExt cx="2279650" cy="1223665"/>
@@ -5532,6 +5532,1630 @@
           </p:txBody>
         </p:sp>
       </p:grpSp>
+      <p:grpSp>
+        <p:nvGrpSpPr>
+          <p:cNvPr id="4" name="グループ化 3">
+            <a:extLst>
+              <a:ext uri="{FF2B5EF4-FFF2-40B4-BE49-F238E27FC236}">
+                <a16:creationId xmlns:a16="http://schemas.microsoft.com/office/drawing/2014/main" id="{22DF75DC-0A1D-73AB-97C8-EF598AD3998C}"/>
+              </a:ext>
+            </a:extLst>
+          </p:cNvPr>
+          <p:cNvGrpSpPr/>
+          <p:nvPr/>
+        </p:nvGrpSpPr>
+        <p:grpSpPr>
+          <a:xfrm>
+            <a:off x="1213807" y="2387409"/>
+            <a:ext cx="2279650" cy="1040586"/>
+            <a:chOff x="6786563" y="1182688"/>
+            <a:chExt cx="2279650" cy="1040586"/>
+          </a:xfrm>
+        </p:grpSpPr>
+        <p:pic>
+          <p:nvPicPr>
+            <p:cNvPr id="2" name="Graphic 21" descr="Amazon Route 53 service icon.">
+              <a:extLst>
+                <a:ext uri="{FF2B5EF4-FFF2-40B4-BE49-F238E27FC236}">
+                  <a16:creationId xmlns:a16="http://schemas.microsoft.com/office/drawing/2014/main" id="{6C0D463D-F288-98BA-22B6-1EF7427E9D82}"/>
+                </a:ext>
+              </a:extLst>
+            </p:cNvPr>
+            <p:cNvPicPr>
+              <a:picLocks noChangeAspect="1" noChangeArrowheads="1"/>
+            </p:cNvPicPr>
+            <p:nvPr/>
+          </p:nvPicPr>
+          <p:blipFill>
+            <a:blip r:embed="rId17">
+              <a:extLst>
+                <a:ext uri="{96DAC541-7B7A-43D3-8B79-37D633B846F1}">
+                  <asvg:svgBlip xmlns:asvg="http://schemas.microsoft.com/office/drawing/2016/SVG/main" r:embed="rId18"/>
+                </a:ext>
+              </a:extLst>
+            </a:blip>
+            <a:srcRect/>
+            <a:stretch/>
+          </p:blipFill>
+          <p:spPr bwMode="auto">
+            <a:xfrm>
+              <a:off x="7534275" y="1182688"/>
+              <a:ext cx="762000" cy="762000"/>
+            </a:xfrm>
+            <a:prstGeom prst="rect">
+              <a:avLst/>
+            </a:prstGeom>
+            <a:noFill/>
+            <a:ln>
+              <a:noFill/>
+            </a:ln>
+            <a:extLst>
+              <a:ext uri="{909E8E84-426E-40DD-AFC4-6F175D3DCCD1}">
+                <a14:hiddenFill xmlns:a14="http://schemas.microsoft.com/office/drawing/2010/main">
+                  <a:solidFill>
+                    <a:srgbClr val="FFFFFF"/>
+                  </a:solidFill>
+                </a14:hiddenFill>
+              </a:ext>
+              <a:ext uri="{91240B29-F687-4F45-9708-019B960494DF}">
+                <a14:hiddenLine xmlns:a14="http://schemas.microsoft.com/office/drawing/2010/main" w="9525">
+                  <a:solidFill>
+                    <a:srgbClr val="000000"/>
+                  </a:solidFill>
+                  <a:miter lim="800000"/>
+                  <a:headEnd/>
+                  <a:tailEnd/>
+                </a14:hiddenLine>
+              </a:ext>
+            </a:extLst>
+          </p:spPr>
+        </p:pic>
+        <p:sp>
+          <p:nvSpPr>
+            <p:cNvPr id="3" name="TextBox 12">
+              <a:extLst>
+                <a:ext uri="{FF2B5EF4-FFF2-40B4-BE49-F238E27FC236}">
+                  <a16:creationId xmlns:a16="http://schemas.microsoft.com/office/drawing/2014/main" id="{D3AFAA55-1DBB-9AF6-A3B6-4BC89F55C1E8}"/>
+                </a:ext>
+              </a:extLst>
+            </p:cNvPr>
+            <p:cNvSpPr txBox="1">
+              <a:spLocks noChangeArrowheads="1"/>
+            </p:cNvSpPr>
+            <p:nvPr/>
+          </p:nvSpPr>
+          <p:spPr bwMode="auto">
+            <a:xfrm>
+              <a:off x="6786563" y="1946275"/>
+              <a:ext cx="2279650" cy="276999"/>
+            </a:xfrm>
+            <a:prstGeom prst="rect">
+              <a:avLst/>
+            </a:prstGeom>
+            <a:noFill/>
+            <a:ln>
+              <a:noFill/>
+            </a:ln>
+            <a:extLst>
+              <a:ext uri="{909E8E84-426E-40DD-AFC4-6F175D3DCCD1}">
+                <a14:hiddenFill xmlns:a14="http://schemas.microsoft.com/office/drawing/2010/main">
+                  <a:solidFill>
+                    <a:srgbClr val="FFFFFF"/>
+                  </a:solidFill>
+                </a14:hiddenFill>
+              </a:ext>
+              <a:ext uri="{91240B29-F687-4F45-9708-019B960494DF}">
+                <a14:hiddenLine xmlns:a14="http://schemas.microsoft.com/office/drawing/2010/main" w="9525">
+                  <a:solidFill>
+                    <a:srgbClr val="000000"/>
+                  </a:solidFill>
+                  <a:miter lim="800000"/>
+                  <a:headEnd/>
+                  <a:tailEnd/>
+                </a14:hiddenLine>
+              </a:ext>
+            </a:extLst>
+          </p:spPr>
+          <p:txBody>
+            <a:bodyPr>
+              <a:spAutoFit/>
+            </a:bodyPr>
+            <a:lstStyle>
+              <a:lvl1pPr>
+                <a:defRPr>
+                  <a:solidFill>
+                    <a:schemeClr val="tx1"/>
+                  </a:solidFill>
+                  <a:latin typeface="Calibri" panose="020F0502020204030204" pitchFamily="34" charset="0"/>
+                </a:defRPr>
+              </a:lvl1pPr>
+              <a:lvl2pPr marL="742950" indent="-285750">
+                <a:defRPr>
+                  <a:solidFill>
+                    <a:schemeClr val="tx1"/>
+                  </a:solidFill>
+                  <a:latin typeface="Calibri" panose="020F0502020204030204" pitchFamily="34" charset="0"/>
+                </a:defRPr>
+              </a:lvl2pPr>
+              <a:lvl3pPr marL="1143000" indent="-228600">
+                <a:defRPr>
+                  <a:solidFill>
+                    <a:schemeClr val="tx1"/>
+                  </a:solidFill>
+                  <a:latin typeface="Calibri" panose="020F0502020204030204" pitchFamily="34" charset="0"/>
+                </a:defRPr>
+              </a:lvl3pPr>
+              <a:lvl4pPr marL="1600200" indent="-228600">
+                <a:defRPr>
+                  <a:solidFill>
+                    <a:schemeClr val="tx1"/>
+                  </a:solidFill>
+                  <a:latin typeface="Calibri" panose="020F0502020204030204" pitchFamily="34" charset="0"/>
+                </a:defRPr>
+              </a:lvl4pPr>
+              <a:lvl5pPr marL="2057400" indent="-228600">
+                <a:defRPr>
+                  <a:solidFill>
+                    <a:schemeClr val="tx1"/>
+                  </a:solidFill>
+                  <a:latin typeface="Calibri" panose="020F0502020204030204" pitchFamily="34" charset="0"/>
+                </a:defRPr>
+              </a:lvl5pPr>
+              <a:lvl6pPr marL="2514600" indent="-228600" eaLnBrk="0" fontAlgn="base" hangingPunct="0">
+                <a:spcBef>
+                  <a:spcPct val="0"/>
+                </a:spcBef>
+                <a:spcAft>
+                  <a:spcPct val="0"/>
+                </a:spcAft>
+                <a:defRPr>
+                  <a:solidFill>
+                    <a:schemeClr val="tx1"/>
+                  </a:solidFill>
+                  <a:latin typeface="Calibri" panose="020F0502020204030204" pitchFamily="34" charset="0"/>
+                </a:defRPr>
+              </a:lvl6pPr>
+              <a:lvl7pPr marL="2971800" indent="-228600" eaLnBrk="0" fontAlgn="base" hangingPunct="0">
+                <a:spcBef>
+                  <a:spcPct val="0"/>
+                </a:spcBef>
+                <a:spcAft>
+                  <a:spcPct val="0"/>
+                </a:spcAft>
+                <a:defRPr>
+                  <a:solidFill>
+                    <a:schemeClr val="tx1"/>
+                  </a:solidFill>
+                  <a:latin typeface="Calibri" panose="020F0502020204030204" pitchFamily="34" charset="0"/>
+                </a:defRPr>
+              </a:lvl7pPr>
+              <a:lvl8pPr marL="3429000" indent="-228600" eaLnBrk="0" fontAlgn="base" hangingPunct="0">
+                <a:spcBef>
+                  <a:spcPct val="0"/>
+                </a:spcBef>
+                <a:spcAft>
+                  <a:spcPct val="0"/>
+                </a:spcAft>
+                <a:defRPr>
+                  <a:solidFill>
+                    <a:schemeClr val="tx1"/>
+                  </a:solidFill>
+                  <a:latin typeface="Calibri" panose="020F0502020204030204" pitchFamily="34" charset="0"/>
+                </a:defRPr>
+              </a:lvl8pPr>
+              <a:lvl9pPr marL="3886200" indent="-228600" eaLnBrk="0" fontAlgn="base" hangingPunct="0">
+                <a:spcBef>
+                  <a:spcPct val="0"/>
+                </a:spcBef>
+                <a:spcAft>
+                  <a:spcPct val="0"/>
+                </a:spcAft>
+                <a:defRPr>
+                  <a:solidFill>
+                    <a:schemeClr val="tx1"/>
+                  </a:solidFill>
+                  <a:latin typeface="Calibri" panose="020F0502020204030204" pitchFamily="34" charset="0"/>
+                </a:defRPr>
+              </a:lvl9pPr>
+            </a:lstStyle>
+            <a:p>
+              <a:pPr algn="ctr" eaLnBrk="1" hangingPunct="1"/>
+              <a:r>
+                <a:rPr lang="en-US" altLang="en-US" sz="1200" dirty="0">
+                  <a:latin typeface="Arial" panose="020B0604020202020204" pitchFamily="34" charset="0"/>
+                  <a:ea typeface="Amazon Ember" panose="020B0603020204020204" pitchFamily="34" charset="0"/>
+                  <a:cs typeface="Arial" panose="020B0604020202020204" pitchFamily="34" charset="0"/>
+                </a:rPr>
+                <a:t>Amazon Route 53</a:t>
+              </a:r>
+            </a:p>
+          </p:txBody>
+        </p:sp>
+      </p:grpSp>
+      <p:grpSp>
+        <p:nvGrpSpPr>
+          <p:cNvPr id="24" name="グループ化 23">
+            <a:extLst>
+              <a:ext uri="{FF2B5EF4-FFF2-40B4-BE49-F238E27FC236}">
+                <a16:creationId xmlns:a16="http://schemas.microsoft.com/office/drawing/2014/main" id="{A08170DF-83EE-4CEC-5423-3052F79EAF82}"/>
+              </a:ext>
+            </a:extLst>
+          </p:cNvPr>
+          <p:cNvGrpSpPr/>
+          <p:nvPr/>
+        </p:nvGrpSpPr>
+        <p:grpSpPr>
+          <a:xfrm>
+            <a:off x="3024765" y="2395738"/>
+            <a:ext cx="2292350" cy="1038999"/>
+            <a:chOff x="4487863" y="1184275"/>
+            <a:chExt cx="2292350" cy="1038999"/>
+          </a:xfrm>
+        </p:grpSpPr>
+        <p:pic>
+          <p:nvPicPr>
+            <p:cNvPr id="7" name="Graphic 19" descr="Amazon CloudFront service icon.">
+              <a:extLst>
+                <a:ext uri="{FF2B5EF4-FFF2-40B4-BE49-F238E27FC236}">
+                  <a16:creationId xmlns:a16="http://schemas.microsoft.com/office/drawing/2014/main" id="{3EAA16D1-7B5F-CBCB-7E94-614F3A11897A}"/>
+                </a:ext>
+              </a:extLst>
+            </p:cNvPr>
+            <p:cNvPicPr>
+              <a:picLocks noChangeAspect="1" noChangeArrowheads="1"/>
+            </p:cNvPicPr>
+            <p:nvPr/>
+          </p:nvPicPr>
+          <p:blipFill>
+            <a:blip r:embed="rId19">
+              <a:extLst>
+                <a:ext uri="{96DAC541-7B7A-43D3-8B79-37D633B846F1}">
+                  <asvg:svgBlip xmlns:asvg="http://schemas.microsoft.com/office/drawing/2016/SVG/main" r:embed="rId20"/>
+                </a:ext>
+              </a:extLst>
+            </a:blip>
+            <a:srcRect/>
+            <a:stretch/>
+          </p:blipFill>
+          <p:spPr bwMode="auto">
+            <a:xfrm>
+              <a:off x="5243513" y="1184275"/>
+              <a:ext cx="762000" cy="762000"/>
+            </a:xfrm>
+            <a:prstGeom prst="rect">
+              <a:avLst/>
+            </a:prstGeom>
+            <a:noFill/>
+            <a:ln>
+              <a:noFill/>
+            </a:ln>
+            <a:extLst>
+              <a:ext uri="{909E8E84-426E-40DD-AFC4-6F175D3DCCD1}">
+                <a14:hiddenFill xmlns:a14="http://schemas.microsoft.com/office/drawing/2010/main">
+                  <a:solidFill>
+                    <a:srgbClr val="FFFFFF"/>
+                  </a:solidFill>
+                </a14:hiddenFill>
+              </a:ext>
+              <a:ext uri="{91240B29-F687-4F45-9708-019B960494DF}">
+                <a14:hiddenLine xmlns:a14="http://schemas.microsoft.com/office/drawing/2010/main" w="9525">
+                  <a:solidFill>
+                    <a:srgbClr val="000000"/>
+                  </a:solidFill>
+                  <a:miter lim="800000"/>
+                  <a:headEnd/>
+                  <a:tailEnd/>
+                </a14:hiddenLine>
+              </a:ext>
+            </a:extLst>
+          </p:spPr>
+        </p:pic>
+        <p:sp>
+          <p:nvSpPr>
+            <p:cNvPr id="23" name="TextBox 11">
+              <a:extLst>
+                <a:ext uri="{FF2B5EF4-FFF2-40B4-BE49-F238E27FC236}">
+                  <a16:creationId xmlns:a16="http://schemas.microsoft.com/office/drawing/2014/main" id="{46A45EBA-49E1-2FE4-50EF-27EB0007503F}"/>
+                </a:ext>
+              </a:extLst>
+            </p:cNvPr>
+            <p:cNvSpPr txBox="1">
+              <a:spLocks noChangeArrowheads="1"/>
+            </p:cNvSpPr>
+            <p:nvPr/>
+          </p:nvSpPr>
+          <p:spPr bwMode="auto">
+            <a:xfrm>
+              <a:off x="4487863" y="1946275"/>
+              <a:ext cx="2292350" cy="276999"/>
+            </a:xfrm>
+            <a:prstGeom prst="rect">
+              <a:avLst/>
+            </a:prstGeom>
+            <a:noFill/>
+            <a:ln>
+              <a:noFill/>
+            </a:ln>
+            <a:extLst>
+              <a:ext uri="{909E8E84-426E-40DD-AFC4-6F175D3DCCD1}">
+                <a14:hiddenFill xmlns:a14="http://schemas.microsoft.com/office/drawing/2010/main">
+                  <a:solidFill>
+                    <a:srgbClr val="FFFFFF"/>
+                  </a:solidFill>
+                </a14:hiddenFill>
+              </a:ext>
+              <a:ext uri="{91240B29-F687-4F45-9708-019B960494DF}">
+                <a14:hiddenLine xmlns:a14="http://schemas.microsoft.com/office/drawing/2010/main" w="9525">
+                  <a:solidFill>
+                    <a:srgbClr val="000000"/>
+                  </a:solidFill>
+                  <a:miter lim="800000"/>
+                  <a:headEnd/>
+                  <a:tailEnd/>
+                </a14:hiddenLine>
+              </a:ext>
+            </a:extLst>
+          </p:spPr>
+          <p:txBody>
+            <a:bodyPr>
+              <a:spAutoFit/>
+            </a:bodyPr>
+            <a:lstStyle>
+              <a:lvl1pPr>
+                <a:defRPr>
+                  <a:solidFill>
+                    <a:schemeClr val="tx1"/>
+                  </a:solidFill>
+                  <a:latin typeface="Calibri" panose="020F0502020204030204" pitchFamily="34" charset="0"/>
+                </a:defRPr>
+              </a:lvl1pPr>
+              <a:lvl2pPr marL="742950" indent="-285750">
+                <a:defRPr>
+                  <a:solidFill>
+                    <a:schemeClr val="tx1"/>
+                  </a:solidFill>
+                  <a:latin typeface="Calibri" panose="020F0502020204030204" pitchFamily="34" charset="0"/>
+                </a:defRPr>
+              </a:lvl2pPr>
+              <a:lvl3pPr marL="1143000" indent="-228600">
+                <a:defRPr>
+                  <a:solidFill>
+                    <a:schemeClr val="tx1"/>
+                  </a:solidFill>
+                  <a:latin typeface="Calibri" panose="020F0502020204030204" pitchFamily="34" charset="0"/>
+                </a:defRPr>
+              </a:lvl3pPr>
+              <a:lvl4pPr marL="1600200" indent="-228600">
+                <a:defRPr>
+                  <a:solidFill>
+                    <a:schemeClr val="tx1"/>
+                  </a:solidFill>
+                  <a:latin typeface="Calibri" panose="020F0502020204030204" pitchFamily="34" charset="0"/>
+                </a:defRPr>
+              </a:lvl4pPr>
+              <a:lvl5pPr marL="2057400" indent="-228600">
+                <a:defRPr>
+                  <a:solidFill>
+                    <a:schemeClr val="tx1"/>
+                  </a:solidFill>
+                  <a:latin typeface="Calibri" panose="020F0502020204030204" pitchFamily="34" charset="0"/>
+                </a:defRPr>
+              </a:lvl5pPr>
+              <a:lvl6pPr marL="2514600" indent="-228600" eaLnBrk="0" fontAlgn="base" hangingPunct="0">
+                <a:spcBef>
+                  <a:spcPct val="0"/>
+                </a:spcBef>
+                <a:spcAft>
+                  <a:spcPct val="0"/>
+                </a:spcAft>
+                <a:defRPr>
+                  <a:solidFill>
+                    <a:schemeClr val="tx1"/>
+                  </a:solidFill>
+                  <a:latin typeface="Calibri" panose="020F0502020204030204" pitchFamily="34" charset="0"/>
+                </a:defRPr>
+              </a:lvl6pPr>
+              <a:lvl7pPr marL="2971800" indent="-228600" eaLnBrk="0" fontAlgn="base" hangingPunct="0">
+                <a:spcBef>
+                  <a:spcPct val="0"/>
+                </a:spcBef>
+                <a:spcAft>
+                  <a:spcPct val="0"/>
+                </a:spcAft>
+                <a:defRPr>
+                  <a:solidFill>
+                    <a:schemeClr val="tx1"/>
+                  </a:solidFill>
+                  <a:latin typeface="Calibri" panose="020F0502020204030204" pitchFamily="34" charset="0"/>
+                </a:defRPr>
+              </a:lvl7pPr>
+              <a:lvl8pPr marL="3429000" indent="-228600" eaLnBrk="0" fontAlgn="base" hangingPunct="0">
+                <a:spcBef>
+                  <a:spcPct val="0"/>
+                </a:spcBef>
+                <a:spcAft>
+                  <a:spcPct val="0"/>
+                </a:spcAft>
+                <a:defRPr>
+                  <a:solidFill>
+                    <a:schemeClr val="tx1"/>
+                  </a:solidFill>
+                  <a:latin typeface="Calibri" panose="020F0502020204030204" pitchFamily="34" charset="0"/>
+                </a:defRPr>
+              </a:lvl8pPr>
+              <a:lvl9pPr marL="3886200" indent="-228600" eaLnBrk="0" fontAlgn="base" hangingPunct="0">
+                <a:spcBef>
+                  <a:spcPct val="0"/>
+                </a:spcBef>
+                <a:spcAft>
+                  <a:spcPct val="0"/>
+                </a:spcAft>
+                <a:defRPr>
+                  <a:solidFill>
+                    <a:schemeClr val="tx1"/>
+                  </a:solidFill>
+                  <a:latin typeface="Calibri" panose="020F0502020204030204" pitchFamily="34" charset="0"/>
+                </a:defRPr>
+              </a:lvl9pPr>
+            </a:lstStyle>
+            <a:p>
+              <a:pPr algn="ctr" eaLnBrk="1" hangingPunct="1"/>
+              <a:r>
+                <a:rPr lang="en-US" altLang="en-US" sz="1200" dirty="0">
+                  <a:latin typeface="Arial" panose="020B0604020202020204" pitchFamily="34" charset="0"/>
+                  <a:ea typeface="Amazon Ember" panose="020B0603020204020204" pitchFamily="34" charset="0"/>
+                  <a:cs typeface="Arial" panose="020B0604020202020204" pitchFamily="34" charset="0"/>
+                </a:rPr>
+                <a:t>Amazon CloudFront</a:t>
+              </a:r>
+            </a:p>
+          </p:txBody>
+        </p:sp>
+      </p:grpSp>
+      <p:grpSp>
+        <p:nvGrpSpPr>
+          <p:cNvPr id="33" name="グループ化 32">
+            <a:extLst>
+              <a:ext uri="{FF2B5EF4-FFF2-40B4-BE49-F238E27FC236}">
+                <a16:creationId xmlns:a16="http://schemas.microsoft.com/office/drawing/2014/main" id="{58FF7A09-224C-B0AC-B55F-AAA9FCF574BC}"/>
+              </a:ext>
+            </a:extLst>
+          </p:cNvPr>
+          <p:cNvGrpSpPr/>
+          <p:nvPr/>
+        </p:nvGrpSpPr>
+        <p:grpSpPr>
+          <a:xfrm>
+            <a:off x="1202694" y="4186367"/>
+            <a:ext cx="2279650" cy="1040586"/>
+            <a:chOff x="6786563" y="1182688"/>
+            <a:chExt cx="2279650" cy="1040586"/>
+          </a:xfrm>
+        </p:grpSpPr>
+        <p:pic>
+          <p:nvPicPr>
+            <p:cNvPr id="34" name="Graphic 21" descr="Amazon Route 53 service icon.">
+              <a:extLst>
+                <a:ext uri="{FF2B5EF4-FFF2-40B4-BE49-F238E27FC236}">
+                  <a16:creationId xmlns:a16="http://schemas.microsoft.com/office/drawing/2014/main" id="{E4413A02-49D9-A215-5D00-9A6AFD5906B9}"/>
+                </a:ext>
+              </a:extLst>
+            </p:cNvPr>
+            <p:cNvPicPr>
+              <a:picLocks noChangeAspect="1" noChangeArrowheads="1"/>
+            </p:cNvPicPr>
+            <p:nvPr/>
+          </p:nvPicPr>
+          <p:blipFill>
+            <a:blip r:embed="rId17">
+              <a:extLst>
+                <a:ext uri="{96DAC541-7B7A-43D3-8B79-37D633B846F1}">
+                  <asvg:svgBlip xmlns:asvg="http://schemas.microsoft.com/office/drawing/2016/SVG/main" r:embed="rId18"/>
+                </a:ext>
+              </a:extLst>
+            </a:blip>
+            <a:srcRect/>
+            <a:stretch/>
+          </p:blipFill>
+          <p:spPr bwMode="auto">
+            <a:xfrm>
+              <a:off x="7534275" y="1182688"/>
+              <a:ext cx="762000" cy="762000"/>
+            </a:xfrm>
+            <a:prstGeom prst="rect">
+              <a:avLst/>
+            </a:prstGeom>
+            <a:noFill/>
+            <a:ln>
+              <a:noFill/>
+            </a:ln>
+            <a:extLst>
+              <a:ext uri="{909E8E84-426E-40DD-AFC4-6F175D3DCCD1}">
+                <a14:hiddenFill xmlns:a14="http://schemas.microsoft.com/office/drawing/2010/main">
+                  <a:solidFill>
+                    <a:srgbClr val="FFFFFF"/>
+                  </a:solidFill>
+                </a14:hiddenFill>
+              </a:ext>
+              <a:ext uri="{91240B29-F687-4F45-9708-019B960494DF}">
+                <a14:hiddenLine xmlns:a14="http://schemas.microsoft.com/office/drawing/2010/main" w="9525">
+                  <a:solidFill>
+                    <a:srgbClr val="000000"/>
+                  </a:solidFill>
+                  <a:miter lim="800000"/>
+                  <a:headEnd/>
+                  <a:tailEnd/>
+                </a14:hiddenLine>
+              </a:ext>
+            </a:extLst>
+          </p:spPr>
+        </p:pic>
+        <p:sp>
+          <p:nvSpPr>
+            <p:cNvPr id="35" name="TextBox 12">
+              <a:extLst>
+                <a:ext uri="{FF2B5EF4-FFF2-40B4-BE49-F238E27FC236}">
+                  <a16:creationId xmlns:a16="http://schemas.microsoft.com/office/drawing/2014/main" id="{982051DC-1347-28D9-0D93-2C14D26CF3ED}"/>
+                </a:ext>
+              </a:extLst>
+            </p:cNvPr>
+            <p:cNvSpPr txBox="1">
+              <a:spLocks noChangeArrowheads="1"/>
+            </p:cNvSpPr>
+            <p:nvPr/>
+          </p:nvSpPr>
+          <p:spPr bwMode="auto">
+            <a:xfrm>
+              <a:off x="6786563" y="1946275"/>
+              <a:ext cx="2279650" cy="276999"/>
+            </a:xfrm>
+            <a:prstGeom prst="rect">
+              <a:avLst/>
+            </a:prstGeom>
+            <a:noFill/>
+            <a:ln>
+              <a:noFill/>
+            </a:ln>
+            <a:extLst>
+              <a:ext uri="{909E8E84-426E-40DD-AFC4-6F175D3DCCD1}">
+                <a14:hiddenFill xmlns:a14="http://schemas.microsoft.com/office/drawing/2010/main">
+                  <a:solidFill>
+                    <a:srgbClr val="FFFFFF"/>
+                  </a:solidFill>
+                </a14:hiddenFill>
+              </a:ext>
+              <a:ext uri="{91240B29-F687-4F45-9708-019B960494DF}">
+                <a14:hiddenLine xmlns:a14="http://schemas.microsoft.com/office/drawing/2010/main" w="9525">
+                  <a:solidFill>
+                    <a:srgbClr val="000000"/>
+                  </a:solidFill>
+                  <a:miter lim="800000"/>
+                  <a:headEnd/>
+                  <a:tailEnd/>
+                </a14:hiddenLine>
+              </a:ext>
+            </a:extLst>
+          </p:spPr>
+          <p:txBody>
+            <a:bodyPr>
+              <a:spAutoFit/>
+            </a:bodyPr>
+            <a:lstStyle>
+              <a:lvl1pPr>
+                <a:defRPr>
+                  <a:solidFill>
+                    <a:schemeClr val="tx1"/>
+                  </a:solidFill>
+                  <a:latin typeface="Calibri" panose="020F0502020204030204" pitchFamily="34" charset="0"/>
+                </a:defRPr>
+              </a:lvl1pPr>
+              <a:lvl2pPr marL="742950" indent="-285750">
+                <a:defRPr>
+                  <a:solidFill>
+                    <a:schemeClr val="tx1"/>
+                  </a:solidFill>
+                  <a:latin typeface="Calibri" panose="020F0502020204030204" pitchFamily="34" charset="0"/>
+                </a:defRPr>
+              </a:lvl2pPr>
+              <a:lvl3pPr marL="1143000" indent="-228600">
+                <a:defRPr>
+                  <a:solidFill>
+                    <a:schemeClr val="tx1"/>
+                  </a:solidFill>
+                  <a:latin typeface="Calibri" panose="020F0502020204030204" pitchFamily="34" charset="0"/>
+                </a:defRPr>
+              </a:lvl3pPr>
+              <a:lvl4pPr marL="1600200" indent="-228600">
+                <a:defRPr>
+                  <a:solidFill>
+                    <a:schemeClr val="tx1"/>
+                  </a:solidFill>
+                  <a:latin typeface="Calibri" panose="020F0502020204030204" pitchFamily="34" charset="0"/>
+                </a:defRPr>
+              </a:lvl4pPr>
+              <a:lvl5pPr marL="2057400" indent="-228600">
+                <a:defRPr>
+                  <a:solidFill>
+                    <a:schemeClr val="tx1"/>
+                  </a:solidFill>
+                  <a:latin typeface="Calibri" panose="020F0502020204030204" pitchFamily="34" charset="0"/>
+                </a:defRPr>
+              </a:lvl5pPr>
+              <a:lvl6pPr marL="2514600" indent="-228600" eaLnBrk="0" fontAlgn="base" hangingPunct="0">
+                <a:spcBef>
+                  <a:spcPct val="0"/>
+                </a:spcBef>
+                <a:spcAft>
+                  <a:spcPct val="0"/>
+                </a:spcAft>
+                <a:defRPr>
+                  <a:solidFill>
+                    <a:schemeClr val="tx1"/>
+                  </a:solidFill>
+                  <a:latin typeface="Calibri" panose="020F0502020204030204" pitchFamily="34" charset="0"/>
+                </a:defRPr>
+              </a:lvl6pPr>
+              <a:lvl7pPr marL="2971800" indent="-228600" eaLnBrk="0" fontAlgn="base" hangingPunct="0">
+                <a:spcBef>
+                  <a:spcPct val="0"/>
+                </a:spcBef>
+                <a:spcAft>
+                  <a:spcPct val="0"/>
+                </a:spcAft>
+                <a:defRPr>
+                  <a:solidFill>
+                    <a:schemeClr val="tx1"/>
+                  </a:solidFill>
+                  <a:latin typeface="Calibri" panose="020F0502020204030204" pitchFamily="34" charset="0"/>
+                </a:defRPr>
+              </a:lvl7pPr>
+              <a:lvl8pPr marL="3429000" indent="-228600" eaLnBrk="0" fontAlgn="base" hangingPunct="0">
+                <a:spcBef>
+                  <a:spcPct val="0"/>
+                </a:spcBef>
+                <a:spcAft>
+                  <a:spcPct val="0"/>
+                </a:spcAft>
+                <a:defRPr>
+                  <a:solidFill>
+                    <a:schemeClr val="tx1"/>
+                  </a:solidFill>
+                  <a:latin typeface="Calibri" panose="020F0502020204030204" pitchFamily="34" charset="0"/>
+                </a:defRPr>
+              </a:lvl8pPr>
+              <a:lvl9pPr marL="3886200" indent="-228600" eaLnBrk="0" fontAlgn="base" hangingPunct="0">
+                <a:spcBef>
+                  <a:spcPct val="0"/>
+                </a:spcBef>
+                <a:spcAft>
+                  <a:spcPct val="0"/>
+                </a:spcAft>
+                <a:defRPr>
+                  <a:solidFill>
+                    <a:schemeClr val="tx1"/>
+                  </a:solidFill>
+                  <a:latin typeface="Calibri" panose="020F0502020204030204" pitchFamily="34" charset="0"/>
+                </a:defRPr>
+              </a:lvl9pPr>
+            </a:lstStyle>
+            <a:p>
+              <a:pPr algn="ctr" eaLnBrk="1" hangingPunct="1"/>
+              <a:r>
+                <a:rPr lang="en-US" altLang="en-US" sz="1200" dirty="0">
+                  <a:latin typeface="Arial" panose="020B0604020202020204" pitchFamily="34" charset="0"/>
+                  <a:ea typeface="Amazon Ember" panose="020B0603020204020204" pitchFamily="34" charset="0"/>
+                  <a:cs typeface="Arial" panose="020B0604020202020204" pitchFamily="34" charset="0"/>
+                </a:rPr>
+                <a:t>Amazon Route 53</a:t>
+              </a:r>
+            </a:p>
+          </p:txBody>
+        </p:sp>
+      </p:grpSp>
+      <p:grpSp>
+        <p:nvGrpSpPr>
+          <p:cNvPr id="36" name="グループ化 35">
+            <a:extLst>
+              <a:ext uri="{FF2B5EF4-FFF2-40B4-BE49-F238E27FC236}">
+                <a16:creationId xmlns:a16="http://schemas.microsoft.com/office/drawing/2014/main" id="{8E83E54F-DB25-49A3-7FA5-EB6EDB81142A}"/>
+              </a:ext>
+            </a:extLst>
+          </p:cNvPr>
+          <p:cNvGrpSpPr/>
+          <p:nvPr/>
+        </p:nvGrpSpPr>
+        <p:grpSpPr>
+          <a:xfrm>
+            <a:off x="3024765" y="4213021"/>
+            <a:ext cx="2292350" cy="1038999"/>
+            <a:chOff x="4487863" y="1184275"/>
+            <a:chExt cx="2292350" cy="1038999"/>
+          </a:xfrm>
+        </p:grpSpPr>
+        <p:pic>
+          <p:nvPicPr>
+            <p:cNvPr id="37" name="Graphic 19" descr="Amazon CloudFront service icon.">
+              <a:extLst>
+                <a:ext uri="{FF2B5EF4-FFF2-40B4-BE49-F238E27FC236}">
+                  <a16:creationId xmlns:a16="http://schemas.microsoft.com/office/drawing/2014/main" id="{6B10044D-8F1E-7D4E-31EF-5ED570E254F1}"/>
+                </a:ext>
+              </a:extLst>
+            </p:cNvPr>
+            <p:cNvPicPr>
+              <a:picLocks noChangeAspect="1" noChangeArrowheads="1"/>
+            </p:cNvPicPr>
+            <p:nvPr/>
+          </p:nvPicPr>
+          <p:blipFill>
+            <a:blip r:embed="rId19">
+              <a:extLst>
+                <a:ext uri="{96DAC541-7B7A-43D3-8B79-37D633B846F1}">
+                  <asvg:svgBlip xmlns:asvg="http://schemas.microsoft.com/office/drawing/2016/SVG/main" r:embed="rId20"/>
+                </a:ext>
+              </a:extLst>
+            </a:blip>
+            <a:srcRect/>
+            <a:stretch/>
+          </p:blipFill>
+          <p:spPr bwMode="auto">
+            <a:xfrm>
+              <a:off x="5243513" y="1184275"/>
+              <a:ext cx="762000" cy="762000"/>
+            </a:xfrm>
+            <a:prstGeom prst="rect">
+              <a:avLst/>
+            </a:prstGeom>
+            <a:noFill/>
+            <a:ln>
+              <a:noFill/>
+            </a:ln>
+            <a:extLst>
+              <a:ext uri="{909E8E84-426E-40DD-AFC4-6F175D3DCCD1}">
+                <a14:hiddenFill xmlns:a14="http://schemas.microsoft.com/office/drawing/2010/main">
+                  <a:solidFill>
+                    <a:srgbClr val="FFFFFF"/>
+                  </a:solidFill>
+                </a14:hiddenFill>
+              </a:ext>
+              <a:ext uri="{91240B29-F687-4F45-9708-019B960494DF}">
+                <a14:hiddenLine xmlns:a14="http://schemas.microsoft.com/office/drawing/2010/main" w="9525">
+                  <a:solidFill>
+                    <a:srgbClr val="000000"/>
+                  </a:solidFill>
+                  <a:miter lim="800000"/>
+                  <a:headEnd/>
+                  <a:tailEnd/>
+                </a14:hiddenLine>
+              </a:ext>
+            </a:extLst>
+          </p:spPr>
+        </p:pic>
+        <p:sp>
+          <p:nvSpPr>
+            <p:cNvPr id="38" name="TextBox 11">
+              <a:extLst>
+                <a:ext uri="{FF2B5EF4-FFF2-40B4-BE49-F238E27FC236}">
+                  <a16:creationId xmlns:a16="http://schemas.microsoft.com/office/drawing/2014/main" id="{E4A6CD15-165A-465C-512D-A8C7A992423D}"/>
+                </a:ext>
+              </a:extLst>
+            </p:cNvPr>
+            <p:cNvSpPr txBox="1">
+              <a:spLocks noChangeArrowheads="1"/>
+            </p:cNvSpPr>
+            <p:nvPr/>
+          </p:nvSpPr>
+          <p:spPr bwMode="auto">
+            <a:xfrm>
+              <a:off x="4487863" y="1946275"/>
+              <a:ext cx="2292350" cy="276999"/>
+            </a:xfrm>
+            <a:prstGeom prst="rect">
+              <a:avLst/>
+            </a:prstGeom>
+            <a:noFill/>
+            <a:ln>
+              <a:noFill/>
+            </a:ln>
+            <a:extLst>
+              <a:ext uri="{909E8E84-426E-40DD-AFC4-6F175D3DCCD1}">
+                <a14:hiddenFill xmlns:a14="http://schemas.microsoft.com/office/drawing/2010/main">
+                  <a:solidFill>
+                    <a:srgbClr val="FFFFFF"/>
+                  </a:solidFill>
+                </a14:hiddenFill>
+              </a:ext>
+              <a:ext uri="{91240B29-F687-4F45-9708-019B960494DF}">
+                <a14:hiddenLine xmlns:a14="http://schemas.microsoft.com/office/drawing/2010/main" w="9525">
+                  <a:solidFill>
+                    <a:srgbClr val="000000"/>
+                  </a:solidFill>
+                  <a:miter lim="800000"/>
+                  <a:headEnd/>
+                  <a:tailEnd/>
+                </a14:hiddenLine>
+              </a:ext>
+            </a:extLst>
+          </p:spPr>
+          <p:txBody>
+            <a:bodyPr>
+              <a:spAutoFit/>
+            </a:bodyPr>
+            <a:lstStyle>
+              <a:lvl1pPr>
+                <a:defRPr>
+                  <a:solidFill>
+                    <a:schemeClr val="tx1"/>
+                  </a:solidFill>
+                  <a:latin typeface="Calibri" panose="020F0502020204030204" pitchFamily="34" charset="0"/>
+                </a:defRPr>
+              </a:lvl1pPr>
+              <a:lvl2pPr marL="742950" indent="-285750">
+                <a:defRPr>
+                  <a:solidFill>
+                    <a:schemeClr val="tx1"/>
+                  </a:solidFill>
+                  <a:latin typeface="Calibri" panose="020F0502020204030204" pitchFamily="34" charset="0"/>
+                </a:defRPr>
+              </a:lvl2pPr>
+              <a:lvl3pPr marL="1143000" indent="-228600">
+                <a:defRPr>
+                  <a:solidFill>
+                    <a:schemeClr val="tx1"/>
+                  </a:solidFill>
+                  <a:latin typeface="Calibri" panose="020F0502020204030204" pitchFamily="34" charset="0"/>
+                </a:defRPr>
+              </a:lvl3pPr>
+              <a:lvl4pPr marL="1600200" indent="-228600">
+                <a:defRPr>
+                  <a:solidFill>
+                    <a:schemeClr val="tx1"/>
+                  </a:solidFill>
+                  <a:latin typeface="Calibri" panose="020F0502020204030204" pitchFamily="34" charset="0"/>
+                </a:defRPr>
+              </a:lvl4pPr>
+              <a:lvl5pPr marL="2057400" indent="-228600">
+                <a:defRPr>
+                  <a:solidFill>
+                    <a:schemeClr val="tx1"/>
+                  </a:solidFill>
+                  <a:latin typeface="Calibri" panose="020F0502020204030204" pitchFamily="34" charset="0"/>
+                </a:defRPr>
+              </a:lvl5pPr>
+              <a:lvl6pPr marL="2514600" indent="-228600" eaLnBrk="0" fontAlgn="base" hangingPunct="0">
+                <a:spcBef>
+                  <a:spcPct val="0"/>
+                </a:spcBef>
+                <a:spcAft>
+                  <a:spcPct val="0"/>
+                </a:spcAft>
+                <a:defRPr>
+                  <a:solidFill>
+                    <a:schemeClr val="tx1"/>
+                  </a:solidFill>
+                  <a:latin typeface="Calibri" panose="020F0502020204030204" pitchFamily="34" charset="0"/>
+                </a:defRPr>
+              </a:lvl6pPr>
+              <a:lvl7pPr marL="2971800" indent="-228600" eaLnBrk="0" fontAlgn="base" hangingPunct="0">
+                <a:spcBef>
+                  <a:spcPct val="0"/>
+                </a:spcBef>
+                <a:spcAft>
+                  <a:spcPct val="0"/>
+                </a:spcAft>
+                <a:defRPr>
+                  <a:solidFill>
+                    <a:schemeClr val="tx1"/>
+                  </a:solidFill>
+                  <a:latin typeface="Calibri" panose="020F0502020204030204" pitchFamily="34" charset="0"/>
+                </a:defRPr>
+              </a:lvl7pPr>
+              <a:lvl8pPr marL="3429000" indent="-228600" eaLnBrk="0" fontAlgn="base" hangingPunct="0">
+                <a:spcBef>
+                  <a:spcPct val="0"/>
+                </a:spcBef>
+                <a:spcAft>
+                  <a:spcPct val="0"/>
+                </a:spcAft>
+                <a:defRPr>
+                  <a:solidFill>
+                    <a:schemeClr val="tx1"/>
+                  </a:solidFill>
+                  <a:latin typeface="Calibri" panose="020F0502020204030204" pitchFamily="34" charset="0"/>
+                </a:defRPr>
+              </a:lvl8pPr>
+              <a:lvl9pPr marL="3886200" indent="-228600" eaLnBrk="0" fontAlgn="base" hangingPunct="0">
+                <a:spcBef>
+                  <a:spcPct val="0"/>
+                </a:spcBef>
+                <a:spcAft>
+                  <a:spcPct val="0"/>
+                </a:spcAft>
+                <a:defRPr>
+                  <a:solidFill>
+                    <a:schemeClr val="tx1"/>
+                  </a:solidFill>
+                  <a:latin typeface="Calibri" panose="020F0502020204030204" pitchFamily="34" charset="0"/>
+                </a:defRPr>
+              </a:lvl9pPr>
+            </a:lstStyle>
+            <a:p>
+              <a:pPr algn="ctr" eaLnBrk="1" hangingPunct="1"/>
+              <a:r>
+                <a:rPr lang="en-US" altLang="en-US" sz="1200" dirty="0">
+                  <a:latin typeface="Arial" panose="020B0604020202020204" pitchFamily="34" charset="0"/>
+                  <a:ea typeface="Amazon Ember" panose="020B0603020204020204" pitchFamily="34" charset="0"/>
+                  <a:cs typeface="Arial" panose="020B0604020202020204" pitchFamily="34" charset="0"/>
+                </a:rPr>
+                <a:t>Amazon CloudFront</a:t>
+              </a:r>
+            </a:p>
+          </p:txBody>
+        </p:sp>
+      </p:grpSp>
+      <p:grpSp>
+        <p:nvGrpSpPr>
+          <p:cNvPr id="41" name="グループ化 40">
+            <a:extLst>
+              <a:ext uri="{FF2B5EF4-FFF2-40B4-BE49-F238E27FC236}">
+                <a16:creationId xmlns:a16="http://schemas.microsoft.com/office/drawing/2014/main" id="{C844ED87-5EDE-5F8F-F0F4-2D1A375B5F01}"/>
+              </a:ext>
+            </a:extLst>
+          </p:cNvPr>
+          <p:cNvGrpSpPr/>
+          <p:nvPr/>
+        </p:nvGrpSpPr>
+        <p:grpSpPr>
+          <a:xfrm>
+            <a:off x="5101078" y="4316881"/>
+            <a:ext cx="1382713" cy="935139"/>
+            <a:chOff x="2190750" y="4201714"/>
+            <a:chExt cx="1382713" cy="935139"/>
+          </a:xfrm>
+        </p:grpSpPr>
+        <p:pic>
+          <p:nvPicPr>
+            <p:cNvPr id="39" name="Graphic 86" descr="Bucket resource icon for the Amazon S3 service.">
+              <a:extLst>
+                <a:ext uri="{FF2B5EF4-FFF2-40B4-BE49-F238E27FC236}">
+                  <a16:creationId xmlns:a16="http://schemas.microsoft.com/office/drawing/2014/main" id="{0397063F-7668-D62F-A785-BD144FEC630A}"/>
+                </a:ext>
+              </a:extLst>
+            </p:cNvPr>
+            <p:cNvPicPr>
+              <a:picLocks noChangeAspect="1"/>
+            </p:cNvPicPr>
+            <p:nvPr/>
+          </p:nvPicPr>
+          <p:blipFill>
+            <a:blip r:embed="rId21">
+              <a:extLst>
+                <a:ext uri="{96DAC541-7B7A-43D3-8B79-37D633B846F1}">
+                  <asvg:svgBlip xmlns:asvg="http://schemas.microsoft.com/office/drawing/2016/SVG/main" r:embed="rId22"/>
+                </a:ext>
+              </a:extLst>
+            </a:blip>
+            <a:stretch>
+              <a:fillRect/>
+            </a:stretch>
+          </p:blipFill>
+          <p:spPr>
+            <a:xfrm>
+              <a:off x="2660928" y="4201714"/>
+              <a:ext cx="457200" cy="457200"/>
+            </a:xfrm>
+            <a:prstGeom prst="rect">
+              <a:avLst/>
+            </a:prstGeom>
+          </p:spPr>
+        </p:pic>
+        <p:sp>
+          <p:nvSpPr>
+            <p:cNvPr id="40" name="TextBox 21">
+              <a:extLst>
+                <a:ext uri="{FF2B5EF4-FFF2-40B4-BE49-F238E27FC236}">
+                  <a16:creationId xmlns:a16="http://schemas.microsoft.com/office/drawing/2014/main" id="{E5C7A420-E80A-807B-C89E-4AE43D29EC71}"/>
+                </a:ext>
+              </a:extLst>
+            </p:cNvPr>
+            <p:cNvSpPr txBox="1">
+              <a:spLocks noChangeArrowheads="1"/>
+            </p:cNvSpPr>
+            <p:nvPr/>
+          </p:nvSpPr>
+          <p:spPr bwMode="auto">
+            <a:xfrm>
+              <a:off x="2190750" y="4675188"/>
+              <a:ext cx="1382713" cy="461665"/>
+            </a:xfrm>
+            <a:prstGeom prst="rect">
+              <a:avLst/>
+            </a:prstGeom>
+            <a:noFill/>
+            <a:ln>
+              <a:noFill/>
+            </a:ln>
+            <a:extLst>
+              <a:ext uri="{909E8E84-426E-40DD-AFC4-6F175D3DCCD1}">
+                <a14:hiddenFill xmlns:a14="http://schemas.microsoft.com/office/drawing/2010/main">
+                  <a:solidFill>
+                    <a:srgbClr val="FFFFFF"/>
+                  </a:solidFill>
+                </a14:hiddenFill>
+              </a:ext>
+              <a:ext uri="{91240B29-F687-4F45-9708-019B960494DF}">
+                <a14:hiddenLine xmlns:a14="http://schemas.microsoft.com/office/drawing/2010/main" w="9525">
+                  <a:solidFill>
+                    <a:srgbClr val="000000"/>
+                  </a:solidFill>
+                  <a:miter lim="800000"/>
+                  <a:headEnd/>
+                  <a:tailEnd/>
+                </a14:hiddenLine>
+              </a:ext>
+            </a:extLst>
+          </p:spPr>
+          <p:txBody>
+            <a:bodyPr>
+              <a:spAutoFit/>
+            </a:bodyPr>
+            <a:lstStyle>
+              <a:lvl1pPr>
+                <a:defRPr>
+                  <a:solidFill>
+                    <a:schemeClr val="tx1"/>
+                  </a:solidFill>
+                  <a:latin typeface="Calibri" panose="020F0502020204030204" pitchFamily="34" charset="0"/>
+                </a:defRPr>
+              </a:lvl1pPr>
+              <a:lvl2pPr marL="742950" indent="-285750">
+                <a:defRPr>
+                  <a:solidFill>
+                    <a:schemeClr val="tx1"/>
+                  </a:solidFill>
+                  <a:latin typeface="Calibri" panose="020F0502020204030204" pitchFamily="34" charset="0"/>
+                </a:defRPr>
+              </a:lvl2pPr>
+              <a:lvl3pPr marL="1143000" indent="-228600">
+                <a:defRPr>
+                  <a:solidFill>
+                    <a:schemeClr val="tx1"/>
+                  </a:solidFill>
+                  <a:latin typeface="Calibri" panose="020F0502020204030204" pitchFamily="34" charset="0"/>
+                </a:defRPr>
+              </a:lvl3pPr>
+              <a:lvl4pPr marL="1600200" indent="-228600">
+                <a:defRPr>
+                  <a:solidFill>
+                    <a:schemeClr val="tx1"/>
+                  </a:solidFill>
+                  <a:latin typeface="Calibri" panose="020F0502020204030204" pitchFamily="34" charset="0"/>
+                </a:defRPr>
+              </a:lvl4pPr>
+              <a:lvl5pPr marL="2057400" indent="-228600">
+                <a:defRPr>
+                  <a:solidFill>
+                    <a:schemeClr val="tx1"/>
+                  </a:solidFill>
+                  <a:latin typeface="Calibri" panose="020F0502020204030204" pitchFamily="34" charset="0"/>
+                </a:defRPr>
+              </a:lvl5pPr>
+              <a:lvl6pPr marL="2514600" indent="-228600" eaLnBrk="0" fontAlgn="base" hangingPunct="0">
+                <a:spcBef>
+                  <a:spcPct val="0"/>
+                </a:spcBef>
+                <a:spcAft>
+                  <a:spcPct val="0"/>
+                </a:spcAft>
+                <a:defRPr>
+                  <a:solidFill>
+                    <a:schemeClr val="tx1"/>
+                  </a:solidFill>
+                  <a:latin typeface="Calibri" panose="020F0502020204030204" pitchFamily="34" charset="0"/>
+                </a:defRPr>
+              </a:lvl6pPr>
+              <a:lvl7pPr marL="2971800" indent="-228600" eaLnBrk="0" fontAlgn="base" hangingPunct="0">
+                <a:spcBef>
+                  <a:spcPct val="0"/>
+                </a:spcBef>
+                <a:spcAft>
+                  <a:spcPct val="0"/>
+                </a:spcAft>
+                <a:defRPr>
+                  <a:solidFill>
+                    <a:schemeClr val="tx1"/>
+                  </a:solidFill>
+                  <a:latin typeface="Calibri" panose="020F0502020204030204" pitchFamily="34" charset="0"/>
+                </a:defRPr>
+              </a:lvl7pPr>
+              <a:lvl8pPr marL="3429000" indent="-228600" eaLnBrk="0" fontAlgn="base" hangingPunct="0">
+                <a:spcBef>
+                  <a:spcPct val="0"/>
+                </a:spcBef>
+                <a:spcAft>
+                  <a:spcPct val="0"/>
+                </a:spcAft>
+                <a:defRPr>
+                  <a:solidFill>
+                    <a:schemeClr val="tx1"/>
+                  </a:solidFill>
+                  <a:latin typeface="Calibri" panose="020F0502020204030204" pitchFamily="34" charset="0"/>
+                </a:defRPr>
+              </a:lvl8pPr>
+              <a:lvl9pPr marL="3886200" indent="-228600" eaLnBrk="0" fontAlgn="base" hangingPunct="0">
+                <a:spcBef>
+                  <a:spcPct val="0"/>
+                </a:spcBef>
+                <a:spcAft>
+                  <a:spcPct val="0"/>
+                </a:spcAft>
+                <a:defRPr>
+                  <a:solidFill>
+                    <a:schemeClr val="tx1"/>
+                  </a:solidFill>
+                  <a:latin typeface="Calibri" panose="020F0502020204030204" pitchFamily="34" charset="0"/>
+                </a:defRPr>
+              </a:lvl9pPr>
+            </a:lstStyle>
+            <a:p>
+              <a:pPr algn="ctr" eaLnBrk="1" hangingPunct="1"/>
+              <a:r>
+                <a:rPr lang="en-US" altLang="en-US" sz="1200" dirty="0" err="1">
+                  <a:latin typeface="Arial" panose="020B0604020202020204" pitchFamily="34" charset="0"/>
+                  <a:ea typeface="Amazon Ember" panose="020B0603020204020204" pitchFamily="34" charset="0"/>
+                  <a:cs typeface="Arial" panose="020B0604020202020204" pitchFamily="34" charset="0"/>
+                </a:rPr>
+                <a:t>sunao</a:t>
+              </a:r>
+              <a:r>
+                <a:rPr lang="en-US" altLang="en-US" sz="1200" dirty="0">
+                  <a:latin typeface="Arial" panose="020B0604020202020204" pitchFamily="34" charset="0"/>
+                  <a:ea typeface="Amazon Ember" panose="020B0603020204020204" pitchFamily="34" charset="0"/>
+                  <a:cs typeface="Arial" panose="020B0604020202020204" pitchFamily="34" charset="0"/>
+                </a:rPr>
+                <a:t>-frontend-deployment-dev</a:t>
+              </a:r>
+            </a:p>
+          </p:txBody>
+        </p:sp>
+      </p:grpSp>
+      <p:pic>
+        <p:nvPicPr>
+          <p:cNvPr id="49" name="図 48">
+            <a:extLst>
+              <a:ext uri="{FF2B5EF4-FFF2-40B4-BE49-F238E27FC236}">
+                <a16:creationId xmlns:a16="http://schemas.microsoft.com/office/drawing/2014/main" id="{25B224AB-4B52-F670-F0CA-C69804FF2264}"/>
+              </a:ext>
+            </a:extLst>
+          </p:cNvPr>
+          <p:cNvPicPr>
+            <a:picLocks noChangeAspect="1"/>
+          </p:cNvPicPr>
+          <p:nvPr/>
+        </p:nvPicPr>
+        <p:blipFill>
+          <a:blip r:embed="rId23"/>
+          <a:stretch>
+            <a:fillRect/>
+          </a:stretch>
+        </p:blipFill>
+        <p:spPr>
+          <a:xfrm>
+            <a:off x="6483791" y="5747525"/>
+            <a:ext cx="830754" cy="830754"/>
+          </a:xfrm>
+          <a:prstGeom prst="rect">
+            <a:avLst/>
+          </a:prstGeom>
+        </p:spPr>
+      </p:pic>
+      <p:cxnSp>
+        <p:nvCxnSpPr>
+          <p:cNvPr id="51" name="コネクタ: カギ線 50">
+            <a:extLst>
+              <a:ext uri="{FF2B5EF4-FFF2-40B4-BE49-F238E27FC236}">
+                <a16:creationId xmlns:a16="http://schemas.microsoft.com/office/drawing/2014/main" id="{BE9FB336-AD21-EC72-93FF-EC507DA68F3D}"/>
+              </a:ext>
+            </a:extLst>
+          </p:cNvPr>
+          <p:cNvCxnSpPr>
+            <a:stCxn id="49" idx="1"/>
+            <a:endCxn id="40" idx="2"/>
+          </p:cNvCxnSpPr>
+          <p:nvPr/>
+        </p:nvCxnSpPr>
+        <p:spPr>
+          <a:xfrm rot="10800000">
+            <a:off x="5792435" y="5252020"/>
+            <a:ext cx="691356" cy="910882"/>
+          </a:xfrm>
+          <a:prstGeom prst="bentConnector2">
+            <a:avLst/>
+          </a:prstGeom>
+          <a:ln>
+            <a:solidFill>
+              <a:schemeClr val="tx1"/>
+            </a:solidFill>
+            <a:tailEnd type="triangle"/>
+          </a:ln>
+        </p:spPr>
+        <p:style>
+          <a:lnRef idx="2">
+            <a:schemeClr val="accent1"/>
+          </a:lnRef>
+          <a:fillRef idx="0">
+            <a:schemeClr val="accent1"/>
+          </a:fillRef>
+          <a:effectRef idx="1">
+            <a:schemeClr val="accent1"/>
+          </a:effectRef>
+          <a:fontRef idx="minor">
+            <a:schemeClr val="tx1"/>
+          </a:fontRef>
+        </p:style>
+      </p:cxnSp>
+      <p:grpSp>
+        <p:nvGrpSpPr>
+          <p:cNvPr id="52" name="グループ化 51">
+            <a:extLst>
+              <a:ext uri="{FF2B5EF4-FFF2-40B4-BE49-F238E27FC236}">
+                <a16:creationId xmlns:a16="http://schemas.microsoft.com/office/drawing/2014/main" id="{AB62E738-7305-AF85-3020-6A875A186B08}"/>
+              </a:ext>
+            </a:extLst>
+          </p:cNvPr>
+          <p:cNvGrpSpPr/>
+          <p:nvPr/>
+        </p:nvGrpSpPr>
+        <p:grpSpPr>
+          <a:xfrm>
+            <a:off x="8014355" y="3849311"/>
+            <a:ext cx="1382713" cy="935139"/>
+            <a:chOff x="2190750" y="4201714"/>
+            <a:chExt cx="1382713" cy="935139"/>
+          </a:xfrm>
+        </p:grpSpPr>
+        <p:pic>
+          <p:nvPicPr>
+            <p:cNvPr id="53" name="Graphic 86" descr="Bucket resource icon for the Amazon S3 service.">
+              <a:extLst>
+                <a:ext uri="{FF2B5EF4-FFF2-40B4-BE49-F238E27FC236}">
+                  <a16:creationId xmlns:a16="http://schemas.microsoft.com/office/drawing/2014/main" id="{8A07F814-66BE-BBBB-1D1D-40E2E352D591}"/>
+                </a:ext>
+              </a:extLst>
+            </p:cNvPr>
+            <p:cNvPicPr>
+              <a:picLocks noChangeAspect="1"/>
+            </p:cNvPicPr>
+            <p:nvPr/>
+          </p:nvPicPr>
+          <p:blipFill>
+            <a:blip r:embed="rId21">
+              <a:extLst>
+                <a:ext uri="{96DAC541-7B7A-43D3-8B79-37D633B846F1}">
+                  <asvg:svgBlip xmlns:asvg="http://schemas.microsoft.com/office/drawing/2016/SVG/main" r:embed="rId22"/>
+                </a:ext>
+              </a:extLst>
+            </a:blip>
+            <a:stretch>
+              <a:fillRect/>
+            </a:stretch>
+          </p:blipFill>
+          <p:spPr>
+            <a:xfrm>
+              <a:off x="2660928" y="4201714"/>
+              <a:ext cx="457200" cy="457200"/>
+            </a:xfrm>
+            <a:prstGeom prst="rect">
+              <a:avLst/>
+            </a:prstGeom>
+          </p:spPr>
+        </p:pic>
+        <p:sp>
+          <p:nvSpPr>
+            <p:cNvPr id="54" name="TextBox 21">
+              <a:extLst>
+                <a:ext uri="{FF2B5EF4-FFF2-40B4-BE49-F238E27FC236}">
+                  <a16:creationId xmlns:a16="http://schemas.microsoft.com/office/drawing/2014/main" id="{327EF53A-EFED-C4B6-06C8-6C1F32699756}"/>
+                </a:ext>
+              </a:extLst>
+            </p:cNvPr>
+            <p:cNvSpPr txBox="1">
+              <a:spLocks noChangeArrowheads="1"/>
+            </p:cNvSpPr>
+            <p:nvPr/>
+          </p:nvSpPr>
+          <p:spPr bwMode="auto">
+            <a:xfrm>
+              <a:off x="2190750" y="4675188"/>
+              <a:ext cx="1382713" cy="461665"/>
+            </a:xfrm>
+            <a:prstGeom prst="rect">
+              <a:avLst/>
+            </a:prstGeom>
+            <a:noFill/>
+            <a:ln>
+              <a:noFill/>
+            </a:ln>
+            <a:extLst>
+              <a:ext uri="{909E8E84-426E-40DD-AFC4-6F175D3DCCD1}">
+                <a14:hiddenFill xmlns:a14="http://schemas.microsoft.com/office/drawing/2010/main">
+                  <a:solidFill>
+                    <a:srgbClr val="FFFFFF"/>
+                  </a:solidFill>
+                </a14:hiddenFill>
+              </a:ext>
+              <a:ext uri="{91240B29-F687-4F45-9708-019B960494DF}">
+                <a14:hiddenLine xmlns:a14="http://schemas.microsoft.com/office/drawing/2010/main" w="9525">
+                  <a:solidFill>
+                    <a:srgbClr val="000000"/>
+                  </a:solidFill>
+                  <a:miter lim="800000"/>
+                  <a:headEnd/>
+                  <a:tailEnd/>
+                </a14:hiddenLine>
+              </a:ext>
+            </a:extLst>
+          </p:spPr>
+          <p:txBody>
+            <a:bodyPr>
+              <a:spAutoFit/>
+            </a:bodyPr>
+            <a:lstStyle>
+              <a:lvl1pPr>
+                <a:defRPr>
+                  <a:solidFill>
+                    <a:schemeClr val="tx1"/>
+                  </a:solidFill>
+                  <a:latin typeface="Calibri" panose="020F0502020204030204" pitchFamily="34" charset="0"/>
+                </a:defRPr>
+              </a:lvl1pPr>
+              <a:lvl2pPr marL="742950" indent="-285750">
+                <a:defRPr>
+                  <a:solidFill>
+                    <a:schemeClr val="tx1"/>
+                  </a:solidFill>
+                  <a:latin typeface="Calibri" panose="020F0502020204030204" pitchFamily="34" charset="0"/>
+                </a:defRPr>
+              </a:lvl2pPr>
+              <a:lvl3pPr marL="1143000" indent="-228600">
+                <a:defRPr>
+                  <a:solidFill>
+                    <a:schemeClr val="tx1"/>
+                  </a:solidFill>
+                  <a:latin typeface="Calibri" panose="020F0502020204030204" pitchFamily="34" charset="0"/>
+                </a:defRPr>
+              </a:lvl3pPr>
+              <a:lvl4pPr marL="1600200" indent="-228600">
+                <a:defRPr>
+                  <a:solidFill>
+                    <a:schemeClr val="tx1"/>
+                  </a:solidFill>
+                  <a:latin typeface="Calibri" panose="020F0502020204030204" pitchFamily="34" charset="0"/>
+                </a:defRPr>
+              </a:lvl4pPr>
+              <a:lvl5pPr marL="2057400" indent="-228600">
+                <a:defRPr>
+                  <a:solidFill>
+                    <a:schemeClr val="tx1"/>
+                  </a:solidFill>
+                  <a:latin typeface="Calibri" panose="020F0502020204030204" pitchFamily="34" charset="0"/>
+                </a:defRPr>
+              </a:lvl5pPr>
+              <a:lvl6pPr marL="2514600" indent="-228600" eaLnBrk="0" fontAlgn="base" hangingPunct="0">
+                <a:spcBef>
+                  <a:spcPct val="0"/>
+                </a:spcBef>
+                <a:spcAft>
+                  <a:spcPct val="0"/>
+                </a:spcAft>
+                <a:defRPr>
+                  <a:solidFill>
+                    <a:schemeClr val="tx1"/>
+                  </a:solidFill>
+                  <a:latin typeface="Calibri" panose="020F0502020204030204" pitchFamily="34" charset="0"/>
+                </a:defRPr>
+              </a:lvl6pPr>
+              <a:lvl7pPr marL="2971800" indent="-228600" eaLnBrk="0" fontAlgn="base" hangingPunct="0">
+                <a:spcBef>
+                  <a:spcPct val="0"/>
+                </a:spcBef>
+                <a:spcAft>
+                  <a:spcPct val="0"/>
+                </a:spcAft>
+                <a:defRPr>
+                  <a:solidFill>
+                    <a:schemeClr val="tx1"/>
+                  </a:solidFill>
+                  <a:latin typeface="Calibri" panose="020F0502020204030204" pitchFamily="34" charset="0"/>
+                </a:defRPr>
+              </a:lvl7pPr>
+              <a:lvl8pPr marL="3429000" indent="-228600" eaLnBrk="0" fontAlgn="base" hangingPunct="0">
+                <a:spcBef>
+                  <a:spcPct val="0"/>
+                </a:spcBef>
+                <a:spcAft>
+                  <a:spcPct val="0"/>
+                </a:spcAft>
+                <a:defRPr>
+                  <a:solidFill>
+                    <a:schemeClr val="tx1"/>
+                  </a:solidFill>
+                  <a:latin typeface="Calibri" panose="020F0502020204030204" pitchFamily="34" charset="0"/>
+                </a:defRPr>
+              </a:lvl8pPr>
+              <a:lvl9pPr marL="3886200" indent="-228600" eaLnBrk="0" fontAlgn="base" hangingPunct="0">
+                <a:spcBef>
+                  <a:spcPct val="0"/>
+                </a:spcBef>
+                <a:spcAft>
+                  <a:spcPct val="0"/>
+                </a:spcAft>
+                <a:defRPr>
+                  <a:solidFill>
+                    <a:schemeClr val="tx1"/>
+                  </a:solidFill>
+                  <a:latin typeface="Calibri" panose="020F0502020204030204" pitchFamily="34" charset="0"/>
+                </a:defRPr>
+              </a:lvl9pPr>
+            </a:lstStyle>
+            <a:p>
+              <a:pPr algn="ctr" eaLnBrk="1" hangingPunct="1"/>
+              <a:r>
+                <a:rPr lang="en-US" altLang="en-US" sz="1200" dirty="0" err="1">
+                  <a:latin typeface="Arial" panose="020B0604020202020204" pitchFamily="34" charset="0"/>
+                  <a:ea typeface="Amazon Ember" panose="020B0603020204020204" pitchFamily="34" charset="0"/>
+                  <a:cs typeface="Arial" panose="020B0604020202020204" pitchFamily="34" charset="0"/>
+                </a:rPr>
+                <a:t>sunao</a:t>
+              </a:r>
+              <a:r>
+                <a:rPr lang="en-US" altLang="en-US" sz="1200" dirty="0">
+                  <a:latin typeface="Arial" panose="020B0604020202020204" pitchFamily="34" charset="0"/>
+                  <a:ea typeface="Amazon Ember" panose="020B0603020204020204" pitchFamily="34" charset="0"/>
+                  <a:cs typeface="Arial" panose="020B0604020202020204" pitchFamily="34" charset="0"/>
+                </a:rPr>
+                <a:t>-</a:t>
+              </a:r>
+              <a:r>
+                <a:rPr lang="en-US" altLang="en-US" sz="1200" dirty="0" err="1">
+                  <a:latin typeface="Arial" panose="020B0604020202020204" pitchFamily="34" charset="0"/>
+                  <a:ea typeface="Amazon Ember" panose="020B0603020204020204" pitchFamily="34" charset="0"/>
+                  <a:cs typeface="Arial" panose="020B0604020202020204" pitchFamily="34" charset="0"/>
+                </a:rPr>
+                <a:t>api</a:t>
+              </a:r>
+              <a:r>
+                <a:rPr lang="en-US" altLang="en-US" sz="1200" dirty="0">
+                  <a:latin typeface="Arial" panose="020B0604020202020204" pitchFamily="34" charset="0"/>
+                  <a:ea typeface="Amazon Ember" panose="020B0603020204020204" pitchFamily="34" charset="0"/>
+                  <a:cs typeface="Arial" panose="020B0604020202020204" pitchFamily="34" charset="0"/>
+                </a:rPr>
+                <a:t>-deployment-dev</a:t>
+              </a:r>
+            </a:p>
+          </p:txBody>
+        </p:sp>
+      </p:grpSp>
+      <p:pic>
+        <p:nvPicPr>
+          <p:cNvPr id="55" name="図 54">
+            <a:extLst>
+              <a:ext uri="{FF2B5EF4-FFF2-40B4-BE49-F238E27FC236}">
+                <a16:creationId xmlns:a16="http://schemas.microsoft.com/office/drawing/2014/main" id="{E48C7468-5CFA-D053-F563-1A43300BF5E4}"/>
+              </a:ext>
+            </a:extLst>
+          </p:cNvPr>
+          <p:cNvPicPr>
+            <a:picLocks noChangeAspect="1"/>
+          </p:cNvPicPr>
+          <p:nvPr/>
+        </p:nvPicPr>
+        <p:blipFill>
+          <a:blip r:embed="rId23"/>
+          <a:stretch>
+            <a:fillRect/>
+          </a:stretch>
+        </p:blipFill>
+        <p:spPr>
+          <a:xfrm>
+            <a:off x="10367017" y="4130104"/>
+            <a:ext cx="830754" cy="830754"/>
+          </a:xfrm>
+          <a:prstGeom prst="rect">
+            <a:avLst/>
+          </a:prstGeom>
+        </p:spPr>
+      </p:pic>
+      <p:cxnSp>
+        <p:nvCxnSpPr>
+          <p:cNvPr id="56" name="コネクタ: カギ線 55">
+            <a:extLst>
+              <a:ext uri="{FF2B5EF4-FFF2-40B4-BE49-F238E27FC236}">
+                <a16:creationId xmlns:a16="http://schemas.microsoft.com/office/drawing/2014/main" id="{1A388752-122F-C202-D14F-CD19273F70E5}"/>
+              </a:ext>
+            </a:extLst>
+          </p:cNvPr>
+          <p:cNvCxnSpPr>
+            <a:cxnSpLocks/>
+            <a:stCxn id="54" idx="1"/>
+            <a:endCxn id="15" idx="2"/>
+          </p:cNvCxnSpPr>
+          <p:nvPr/>
+        </p:nvCxnSpPr>
+        <p:spPr>
+          <a:xfrm rot="10800000">
+            <a:off x="7559537" y="3425614"/>
+            <a:ext cx="454818" cy="1128004"/>
+          </a:xfrm>
+          <a:prstGeom prst="bentConnector2">
+            <a:avLst/>
+          </a:prstGeom>
+          <a:ln>
+            <a:solidFill>
+              <a:schemeClr val="tx1"/>
+            </a:solidFill>
+            <a:tailEnd type="triangle"/>
+          </a:ln>
+        </p:spPr>
+        <p:style>
+          <a:lnRef idx="2">
+            <a:schemeClr val="accent1"/>
+          </a:lnRef>
+          <a:fillRef idx="0">
+            <a:schemeClr val="accent1"/>
+          </a:fillRef>
+          <a:effectRef idx="1">
+            <a:schemeClr val="accent1"/>
+          </a:effectRef>
+          <a:fontRef idx="minor">
+            <a:schemeClr val="tx1"/>
+          </a:fontRef>
+        </p:style>
+      </p:cxnSp>
+      <p:cxnSp>
+        <p:nvCxnSpPr>
+          <p:cNvPr id="60" name="直線矢印コネクタ 59">
+            <a:extLst>
+              <a:ext uri="{FF2B5EF4-FFF2-40B4-BE49-F238E27FC236}">
+                <a16:creationId xmlns:a16="http://schemas.microsoft.com/office/drawing/2014/main" id="{144F2526-10EC-3101-1378-7AA40C93C4C9}"/>
+              </a:ext>
+            </a:extLst>
+          </p:cNvPr>
+          <p:cNvCxnSpPr>
+            <a:stCxn id="55" idx="1"/>
+            <a:endCxn id="54" idx="3"/>
+          </p:cNvCxnSpPr>
+          <p:nvPr/>
+        </p:nvCxnSpPr>
+        <p:spPr>
+          <a:xfrm flipH="1">
+            <a:off x="9397068" y="4545481"/>
+            <a:ext cx="969949" cy="8137"/>
+          </a:xfrm>
+          <a:prstGeom prst="straightConnector1">
+            <a:avLst/>
+          </a:prstGeom>
+          <a:ln>
+            <a:solidFill>
+              <a:schemeClr val="tx1"/>
+            </a:solidFill>
+            <a:tailEnd type="triangle"/>
+          </a:ln>
+        </p:spPr>
+        <p:style>
+          <a:lnRef idx="2">
+            <a:schemeClr val="accent1"/>
+          </a:lnRef>
+          <a:fillRef idx="0">
+            <a:schemeClr val="accent1"/>
+          </a:fillRef>
+          <a:effectRef idx="1">
+            <a:schemeClr val="accent1"/>
+          </a:effectRef>
+          <a:fontRef idx="minor">
+            <a:schemeClr val="tx1"/>
+          </a:fontRef>
+        </p:style>
+      </p:cxnSp>
     </p:spTree>
     <p:extLst>
       <p:ext uri="{BB962C8B-B14F-4D97-AF65-F5344CB8AC3E}">

</xml_diff>